<commit_message>
bracket 추가된 alias로 교체
</commit_message>
<xml_diff>
--- a/documents/개발계획서.pptx
+++ b/documents/개발계획서.pptx
@@ -208,7 +208,7 @@
           <a:p>
             <a:fld id="{9458FFD9-5838-1449-9919-C8A4367C6D0D}" type="datetimeFigureOut">
               <a:rPr kumimoji="1" lang="ko-KR" altLang="en-US" smtClean="0"/>
-              <a:t>2025. 4. 10.</a:t>
+              <a:t>2025. 4. 14.</a:t>
             </a:fld>
             <a:endParaRPr kumimoji="1" lang="ko-KR" altLang="en-US"/>
           </a:p>
@@ -1051,7 +1051,7 @@
           <a:p>
             <a:fld id="{B2310862-A932-4A4D-BE7A-7832C8DBE490}" type="datetimeFigureOut">
               <a:rPr kumimoji="1" lang="ko-KR" altLang="en-US" smtClean="0"/>
-              <a:t>2025. 4. 10.</a:t>
+              <a:t>2025. 4. 14.</a:t>
             </a:fld>
             <a:endParaRPr kumimoji="1" lang="ko-KR" altLang="en-US"/>
           </a:p>
@@ -1221,7 +1221,7 @@
           <a:p>
             <a:fld id="{B2310862-A932-4A4D-BE7A-7832C8DBE490}" type="datetimeFigureOut">
               <a:rPr kumimoji="1" lang="ko-KR" altLang="en-US" smtClean="0"/>
-              <a:t>2025. 4. 10.</a:t>
+              <a:t>2025. 4. 14.</a:t>
             </a:fld>
             <a:endParaRPr kumimoji="1" lang="ko-KR" altLang="en-US"/>
           </a:p>
@@ -1401,7 +1401,7 @@
           <a:p>
             <a:fld id="{B2310862-A932-4A4D-BE7A-7832C8DBE490}" type="datetimeFigureOut">
               <a:rPr kumimoji="1" lang="ko-KR" altLang="en-US" smtClean="0"/>
-              <a:t>2025. 4. 10.</a:t>
+              <a:t>2025. 4. 14.</a:t>
             </a:fld>
             <a:endParaRPr kumimoji="1" lang="ko-KR" altLang="en-US"/>
           </a:p>
@@ -1571,7 +1571,7 @@
           <a:p>
             <a:fld id="{B2310862-A932-4A4D-BE7A-7832C8DBE490}" type="datetimeFigureOut">
               <a:rPr kumimoji="1" lang="ko-KR" altLang="en-US" smtClean="0"/>
-              <a:t>2025. 4. 10.</a:t>
+              <a:t>2025. 4. 14.</a:t>
             </a:fld>
             <a:endParaRPr kumimoji="1" lang="ko-KR" altLang="en-US"/>
           </a:p>
@@ -1817,7 +1817,7 @@
           <a:p>
             <a:fld id="{B2310862-A932-4A4D-BE7A-7832C8DBE490}" type="datetimeFigureOut">
               <a:rPr kumimoji="1" lang="ko-KR" altLang="en-US" smtClean="0"/>
-              <a:t>2025. 4. 10.</a:t>
+              <a:t>2025. 4. 14.</a:t>
             </a:fld>
             <a:endParaRPr kumimoji="1" lang="ko-KR" altLang="en-US"/>
           </a:p>
@@ -2049,7 +2049,7 @@
           <a:p>
             <a:fld id="{B2310862-A932-4A4D-BE7A-7832C8DBE490}" type="datetimeFigureOut">
               <a:rPr kumimoji="1" lang="ko-KR" altLang="en-US" smtClean="0"/>
-              <a:t>2025. 4. 10.</a:t>
+              <a:t>2025. 4. 14.</a:t>
             </a:fld>
             <a:endParaRPr kumimoji="1" lang="ko-KR" altLang="en-US"/>
           </a:p>
@@ -2416,7 +2416,7 @@
           <a:p>
             <a:fld id="{B2310862-A932-4A4D-BE7A-7832C8DBE490}" type="datetimeFigureOut">
               <a:rPr kumimoji="1" lang="ko-KR" altLang="en-US" smtClean="0"/>
-              <a:t>2025. 4. 10.</a:t>
+              <a:t>2025. 4. 14.</a:t>
             </a:fld>
             <a:endParaRPr kumimoji="1" lang="ko-KR" altLang="en-US"/>
           </a:p>
@@ -2534,7 +2534,7 @@
           <a:p>
             <a:fld id="{B2310862-A932-4A4D-BE7A-7832C8DBE490}" type="datetimeFigureOut">
               <a:rPr kumimoji="1" lang="ko-KR" altLang="en-US" smtClean="0"/>
-              <a:t>2025. 4. 10.</a:t>
+              <a:t>2025. 4. 14.</a:t>
             </a:fld>
             <a:endParaRPr kumimoji="1" lang="ko-KR" altLang="en-US"/>
           </a:p>
@@ -2629,7 +2629,7 @@
           <a:p>
             <a:fld id="{B2310862-A932-4A4D-BE7A-7832C8DBE490}" type="datetimeFigureOut">
               <a:rPr kumimoji="1" lang="ko-KR" altLang="en-US" smtClean="0"/>
-              <a:t>2025. 4. 10.</a:t>
+              <a:t>2025. 4. 14.</a:t>
             </a:fld>
             <a:endParaRPr kumimoji="1" lang="ko-KR" altLang="en-US"/>
           </a:p>
@@ -2906,7 +2906,7 @@
           <a:p>
             <a:fld id="{B2310862-A932-4A4D-BE7A-7832C8DBE490}" type="datetimeFigureOut">
               <a:rPr kumimoji="1" lang="ko-KR" altLang="en-US" smtClean="0"/>
-              <a:t>2025. 4. 10.</a:t>
+              <a:t>2025. 4. 14.</a:t>
             </a:fld>
             <a:endParaRPr kumimoji="1" lang="ko-KR" altLang="en-US"/>
           </a:p>
@@ -3163,7 +3163,7 @@
           <a:p>
             <a:fld id="{B2310862-A932-4A4D-BE7A-7832C8DBE490}" type="datetimeFigureOut">
               <a:rPr kumimoji="1" lang="ko-KR" altLang="en-US" smtClean="0"/>
-              <a:t>2025. 4. 10.</a:t>
+              <a:t>2025. 4. 14.</a:t>
             </a:fld>
             <a:endParaRPr kumimoji="1" lang="ko-KR" altLang="en-US"/>
           </a:p>
@@ -3376,7 +3376,7 @@
           <a:p>
             <a:fld id="{B2310862-A932-4A4D-BE7A-7832C8DBE490}" type="datetimeFigureOut">
               <a:rPr kumimoji="1" lang="ko-KR" altLang="en-US" smtClean="0"/>
-              <a:t>2025. 4. 10.</a:t>
+              <a:t>2025. 4. 14.</a:t>
             </a:fld>
             <a:endParaRPr kumimoji="1" lang="ko-KR" altLang="en-US"/>
           </a:p>
@@ -19200,7 +19200,7 @@
         </p:nvPicPr>
         <p:blipFill>
           <a:blip r:embed="rId24">
-            <a:alphaModFix amt="35000"/>
+            <a:alphaModFix/>
           </a:blip>
           <a:stretch>
             <a:fillRect/>

</xml_diff>